<commit_message>
Improving typography, more slide types
</commit_message>
<xml_diff>
--- a/Orchard Harvest 2024 presentation template.pptx
+++ b/Orchard Harvest 2024 presentation template.pptx
@@ -5,37 +5,38 @@
     <p:sldMasterId id="2147483659" r:id="rId1"/>
   </p:sldMasterIdLst>
   <p:notesMasterIdLst>
-    <p:notesMasterId r:id="rId6"/>
+    <p:notesMasterId r:id="rId7"/>
   </p:notesMasterIdLst>
   <p:sldIdLst>
     <p:sldId id="256" r:id="rId2"/>
     <p:sldId id="257" r:id="rId3"/>
     <p:sldId id="258" r:id="rId4"/>
     <p:sldId id="259" r:id="rId5"/>
+    <p:sldId id="260" r:id="rId6"/>
   </p:sldIdLst>
   <p:sldSz cx="9144000" cy="5143500" type="screen16x9"/>
   <p:notesSz cx="6858000" cy="9144000"/>
   <p:embeddedFontLst>
     <p:embeddedFont>
       <p:font typeface="Lato" panose="020F0502020204030203" pitchFamily="34" charset="0"/>
-      <p:regular r:id="rId7"/>
-      <p:bold r:id="rId8"/>
-      <p:italic r:id="rId9"/>
-      <p:boldItalic r:id="rId10"/>
+      <p:regular r:id="rId8"/>
+      <p:bold r:id="rId9"/>
+      <p:italic r:id="rId10"/>
+      <p:boldItalic r:id="rId11"/>
     </p:embeddedFont>
     <p:embeddedFont>
       <p:font typeface="Montserrat" panose="00000500000000000000" pitchFamily="2" charset="0"/>
-      <p:regular r:id="rId11"/>
-      <p:bold r:id="rId12"/>
-      <p:italic r:id="rId13"/>
-      <p:boldItalic r:id="rId14"/>
+      <p:regular r:id="rId12"/>
+      <p:bold r:id="rId13"/>
+      <p:italic r:id="rId14"/>
+      <p:boldItalic r:id="rId15"/>
     </p:embeddedFont>
     <p:embeddedFont>
       <p:font typeface="Montserrat SemiBold" panose="00000700000000000000" pitchFamily="2" charset="0"/>
-      <p:regular r:id="rId15"/>
-      <p:bold r:id="rId16"/>
-      <p:italic r:id="rId17"/>
-      <p:boldItalic r:id="rId18"/>
+      <p:regular r:id="rId16"/>
+      <p:bold r:id="rId17"/>
+      <p:italic r:id="rId18"/>
+      <p:boldItalic r:id="rId19"/>
     </p:embeddedFont>
   </p:embeddedFontLst>
   <p:defaultTextStyle>
@@ -1136,6 +1137,115 @@
         </p:txBody>
       </p:sp>
     </p:spTree>
+  </p:cSld>
+  <p:clrMapOvr>
+    <a:masterClrMapping/>
+  </p:clrMapOvr>
+</p:notes>
+</file>
+
+<file path=ppt/notesSlides/notesSlide5.xml><?xml version="1.0" encoding="utf-8"?>
+<p:notes xmlns:a="http://schemas.openxmlformats.org/drawingml/2006/main" xmlns:r="http://schemas.openxmlformats.org/officeDocument/2006/relationships" xmlns:p="http://schemas.openxmlformats.org/presentationml/2006/main" showMasterSp="0" showMasterPhAnim="0">
+  <p:cSld>
+    <p:spTree>
+      <p:nvGrpSpPr>
+        <p:cNvPr id="1" name="Shape 173"/>
+        <p:cNvGrpSpPr/>
+        <p:nvPr/>
+      </p:nvGrpSpPr>
+      <p:grpSpPr>
+        <a:xfrm>
+          <a:off x="0" y="0"/>
+          <a:ext cx="0" cy="0"/>
+          <a:chOff x="0" y="0"/>
+          <a:chExt cx="0" cy="0"/>
+        </a:xfrm>
+      </p:grpSpPr>
+      <p:sp>
+        <p:nvSpPr>
+          <p:cNvPr id="174" name="Google Shape;174;g242cf0fc797_2_1:notes"/>
+          <p:cNvSpPr>
+            <a:spLocks noGrp="1" noRot="1" noChangeAspect="1"/>
+          </p:cNvSpPr>
+          <p:nvPr>
+            <p:ph type="sldImg" idx="2"/>
+          </p:nvPr>
+        </p:nvSpPr>
+        <p:spPr>
+          <a:xfrm>
+            <a:off x="381000" y="685800"/>
+            <a:ext cx="6096000" cy="3429000"/>
+          </a:xfrm>
+          <a:custGeom>
+            <a:avLst/>
+            <a:gdLst/>
+            <a:ahLst/>
+            <a:cxnLst/>
+            <a:rect l="l" t="t" r="r" b="b"/>
+            <a:pathLst>
+              <a:path w="120000" h="120000" extrusionOk="0">
+                <a:moveTo>
+                  <a:pt x="0" y="0"/>
+                </a:moveTo>
+                <a:lnTo>
+                  <a:pt x="120000" y="0"/>
+                </a:lnTo>
+                <a:lnTo>
+                  <a:pt x="120000" y="120000"/>
+                </a:lnTo>
+                <a:lnTo>
+                  <a:pt x="0" y="120000"/>
+                </a:lnTo>
+                <a:close/>
+              </a:path>
+            </a:pathLst>
+          </a:custGeom>
+        </p:spPr>
+      </p:sp>
+      <p:sp>
+        <p:nvSpPr>
+          <p:cNvPr id="175" name="Google Shape;175;g242cf0fc797_2_1:notes"/>
+          <p:cNvSpPr txBox="1">
+            <a:spLocks noGrp="1"/>
+          </p:cNvSpPr>
+          <p:nvPr>
+            <p:ph type="body" idx="1"/>
+          </p:nvPr>
+        </p:nvSpPr>
+        <p:spPr>
+          <a:xfrm>
+            <a:off x="685800" y="4343400"/>
+            <a:ext cx="5486400" cy="4114800"/>
+          </a:xfrm>
+          <a:prstGeom prst="rect">
+            <a:avLst/>
+          </a:prstGeom>
+        </p:spPr>
+        <p:txBody>
+          <a:bodyPr spcFirstLastPara="1" wrap="square" lIns="91425" tIns="91425" rIns="91425" bIns="91425" anchor="t" anchorCtr="0">
+            <a:noAutofit/>
+          </a:bodyPr>
+          <a:lstStyle/>
+          <a:p>
+            <a:pPr marL="0" lvl="0" indent="0" algn="l" rtl="0">
+              <a:spcBef>
+                <a:spcPts val="0"/>
+              </a:spcBef>
+              <a:spcAft>
+                <a:spcPts val="0"/>
+              </a:spcAft>
+              <a:buNone/>
+            </a:pPr>
+            <a:endParaRPr/>
+          </a:p>
+        </p:txBody>
+      </p:sp>
+    </p:spTree>
+    <p:extLst>
+      <p:ext uri="{BB962C8B-B14F-4D97-AF65-F5344CB8AC3E}">
+        <p14:creationId xmlns:p14="http://schemas.microsoft.com/office/powerpoint/2010/main" val="3308505031"/>
+      </p:ext>
+    </p:extLst>
   </p:cSld>
   <p:clrMapOvr>
     <a:masterClrMapping/>
@@ -9308,14 +9418,14 @@
               <a:buNone/>
             </a:pPr>
             <a:r>
-              <a:rPr lang="en">
+              <a:rPr lang="en" dirty="0">
                 <a:solidFill>
                   <a:srgbClr val="41B670"/>
                 </a:solidFill>
               </a:rPr>
-              <a:t>Session Title</a:t>
+              <a:t>Talk Title</a:t>
             </a:r>
-            <a:endParaRPr>
+            <a:endParaRPr dirty="0">
               <a:solidFill>
                 <a:srgbClr val="41B670"/>
               </a:solidFill>
@@ -9757,10 +9867,10 @@
               <a:buNone/>
             </a:pPr>
             <a:r>
-              <a:rPr lang="en"/>
+              <a:rPr lang="en" dirty="0"/>
               <a:t>About Me</a:t>
             </a:r>
-            <a:endParaRPr>
+            <a:endParaRPr dirty="0">
               <a:solidFill>
                 <a:schemeClr val="dk1"/>
               </a:solidFill>
@@ -9789,7 +9899,7 @@
         </p:spPr>
         <p:txBody>
           <a:bodyPr spcFirstLastPara="1" wrap="square" lIns="91425" tIns="91425" rIns="91425" bIns="91425" anchor="t" anchorCtr="0">
-            <a:normAutofit lnSpcReduction="10000"/>
+            <a:normAutofit fontScale="85000" lnSpcReduction="20000"/>
           </a:bodyPr>
           <a:lstStyle/>
           <a:p>
@@ -9803,14 +9913,14 @@
               <a:buNone/>
             </a:pPr>
             <a:r>
-              <a:rPr lang="en" sz="1600" b="1" dirty="0">
+              <a:rPr lang="en" sz="2000" b="1" dirty="0">
                 <a:solidFill>
                   <a:srgbClr val="41B670"/>
                 </a:solidFill>
               </a:rPr>
               <a:t>JON DOE</a:t>
             </a:r>
-            <a:endParaRPr sz="1600" b="1" dirty="0">
+            <a:endParaRPr sz="2000" b="1" dirty="0">
               <a:solidFill>
                 <a:srgbClr val="41B670"/>
               </a:solidFill>
@@ -9827,14 +9937,14 @@
               <a:buNone/>
             </a:pPr>
             <a:r>
-              <a:rPr lang="en" sz="1600" dirty="0">
+              <a:rPr lang="en" sz="1900" dirty="0">
                 <a:solidFill>
                   <a:schemeClr val="dk1"/>
                 </a:solidFill>
               </a:rPr>
               <a:t>Job Title</a:t>
             </a:r>
-            <a:endParaRPr sz="1600" dirty="0">
+            <a:endParaRPr sz="1900" dirty="0">
               <a:solidFill>
                 <a:schemeClr val="dk1"/>
               </a:solidFill>
@@ -9850,7 +9960,7 @@
               </a:spcAft>
               <a:buNone/>
             </a:pPr>
-            <a:endParaRPr sz="1600" b="1" dirty="0">
+            <a:endParaRPr sz="1800" b="1" dirty="0">
               <a:solidFill>
                 <a:schemeClr val="dk1"/>
               </a:solidFill>
@@ -9866,7 +9976,7 @@
               </a:spcAft>
               <a:buNone/>
             </a:pPr>
-            <a:endParaRPr sz="1600" b="1" dirty="0">
+            <a:endParaRPr sz="1800" b="1" dirty="0">
               <a:solidFill>
                 <a:schemeClr val="dk1"/>
               </a:solidFill>
@@ -9883,7 +9993,7 @@
               <a:buNone/>
             </a:pPr>
             <a:r>
-              <a:rPr lang="en" b="1" dirty="0">
+              <a:rPr lang="en" sz="1900" b="1" dirty="0">
                 <a:solidFill>
                   <a:schemeClr val="dk1"/>
                 </a:solidFill>
@@ -9891,14 +10001,14 @@
               <a:t>Website:</a:t>
             </a:r>
             <a:r>
-              <a:rPr lang="en" dirty="0">
+              <a:rPr lang="en" sz="1900" dirty="0">
                 <a:solidFill>
                   <a:schemeClr val="dk1"/>
                 </a:solidFill>
               </a:rPr>
               <a:t> http://www.jdoe.com</a:t>
             </a:r>
-            <a:endParaRPr dirty="0">
+            <a:endParaRPr sz="1900" dirty="0">
               <a:solidFill>
                 <a:schemeClr val="dk1"/>
               </a:solidFill>
@@ -9915,7 +10025,7 @@
               <a:buNone/>
             </a:pPr>
             <a:r>
-              <a:rPr lang="en" b="1" dirty="0">
+              <a:rPr lang="en" sz="1900" b="1" dirty="0">
                 <a:solidFill>
                   <a:schemeClr val="dk1"/>
                 </a:solidFill>
@@ -9923,14 +10033,14 @@
               <a:t>GitHub:</a:t>
             </a:r>
             <a:r>
-              <a:rPr lang="en" dirty="0">
+              <a:rPr lang="en" sz="1900" dirty="0">
                 <a:solidFill>
                   <a:schemeClr val="dk1"/>
                 </a:solidFill>
               </a:rPr>
               <a:t> https://github.com/jdoe</a:t>
             </a:r>
-            <a:endParaRPr dirty="0">
+            <a:endParaRPr sz="1900" dirty="0">
               <a:solidFill>
                 <a:schemeClr val="dk1"/>
               </a:solidFill>
@@ -9947,7 +10057,7 @@
               <a:buNone/>
             </a:pPr>
             <a:r>
-              <a:rPr lang="en" b="1" dirty="0">
+              <a:rPr lang="en" sz="1900" b="1" dirty="0">
                 <a:solidFill>
                   <a:schemeClr val="dk1"/>
                 </a:solidFill>
@@ -9955,14 +10065,14 @@
               <a:t>X (Twitter):</a:t>
             </a:r>
             <a:r>
-              <a:rPr lang="en" dirty="0">
+              <a:rPr lang="en" sz="1900" dirty="0">
                 <a:solidFill>
                   <a:schemeClr val="dk1"/>
                 </a:solidFill>
               </a:rPr>
               <a:t> https://x.com/jdoe</a:t>
             </a:r>
-            <a:endParaRPr dirty="0">
+            <a:endParaRPr sz="1900" dirty="0">
               <a:solidFill>
                 <a:schemeClr val="dk1"/>
               </a:solidFill>
@@ -10326,10 +10436,10 @@
               <a:buNone/>
             </a:pPr>
             <a:r>
-              <a:rPr lang="en"/>
+              <a:rPr lang="en" dirty="0"/>
               <a:t>Agenda</a:t>
             </a:r>
-            <a:endParaRPr>
+            <a:endParaRPr dirty="0">
               <a:solidFill>
                 <a:schemeClr val="dk1"/>
               </a:solidFill>
@@ -10379,14 +10489,14 @@
               <a:buChar char="●"/>
             </a:pPr>
             <a:r>
-              <a:rPr lang="en" sz="1400">
+              <a:rPr lang="en" sz="1800" dirty="0">
                 <a:solidFill>
                   <a:schemeClr val="dk1"/>
                 </a:solidFill>
               </a:rPr>
               <a:t>Title 1 goes here</a:t>
             </a:r>
-            <a:endParaRPr sz="1400">
+            <a:endParaRPr sz="1800" dirty="0">
               <a:solidFill>
                 <a:schemeClr val="dk1"/>
               </a:solidFill>
@@ -10410,14 +10520,14 @@
               <a:buChar char="●"/>
             </a:pPr>
             <a:r>
-              <a:rPr lang="en" sz="1400">
+              <a:rPr lang="en" sz="1800" dirty="0">
                 <a:solidFill>
                   <a:schemeClr val="dk1"/>
                 </a:solidFill>
               </a:rPr>
               <a:t>Title 2 goes here</a:t>
             </a:r>
-            <a:endParaRPr sz="1400">
+            <a:endParaRPr sz="1800" dirty="0">
               <a:solidFill>
                 <a:schemeClr val="dk1"/>
               </a:solidFill>
@@ -10441,14 +10551,14 @@
               <a:buChar char="●"/>
             </a:pPr>
             <a:r>
-              <a:rPr lang="en" sz="1400">
+              <a:rPr lang="en" sz="1800" dirty="0">
                 <a:solidFill>
                   <a:schemeClr val="dk1"/>
                 </a:solidFill>
               </a:rPr>
               <a:t>Title 3 goes here</a:t>
             </a:r>
-            <a:endParaRPr sz="1400">
+            <a:endParaRPr sz="1800" dirty="0">
               <a:solidFill>
                 <a:schemeClr val="dk1"/>
               </a:solidFill>
@@ -10858,14 +10968,14 @@
               <a:buNone/>
             </a:pPr>
             <a:r>
-              <a:rPr lang="en" sz="1400">
+              <a:rPr lang="en" sz="1800" dirty="0">
                 <a:solidFill>
                   <a:schemeClr val="dk1"/>
                 </a:solidFill>
               </a:rPr>
               <a:t>Content goes here …</a:t>
             </a:r>
-            <a:endParaRPr sz="1400">
+            <a:endParaRPr sz="1800" dirty="0">
               <a:solidFill>
                 <a:schemeClr val="dk1"/>
               </a:solidFill>
@@ -11170,6 +11280,394 @@
         </p:sp>
       </p:grpSp>
     </p:spTree>
+  </p:cSld>
+  <p:clrMapOvr>
+    <a:masterClrMapping/>
+  </p:clrMapOvr>
+</p:sld>
+</file>
+
+<file path=ppt/slides/slide5.xml><?xml version="1.0" encoding="utf-8"?>
+<p:sld xmlns:a="http://schemas.openxmlformats.org/drawingml/2006/main" xmlns:r="http://schemas.openxmlformats.org/officeDocument/2006/relationships" xmlns:p="http://schemas.openxmlformats.org/presentationml/2006/main">
+  <p:cSld>
+    <p:spTree>
+      <p:nvGrpSpPr>
+        <p:cNvPr id="1" name="Shape 176"/>
+        <p:cNvGrpSpPr/>
+        <p:nvPr/>
+      </p:nvGrpSpPr>
+      <p:grpSpPr>
+        <a:xfrm>
+          <a:off x="0" y="0"/>
+          <a:ext cx="0" cy="0"/>
+          <a:chOff x="0" y="0"/>
+          <a:chExt cx="0" cy="0"/>
+        </a:xfrm>
+      </p:grpSpPr>
+      <p:sp>
+        <p:nvSpPr>
+          <p:cNvPr id="177" name="Google Shape;177;p16"/>
+          <p:cNvSpPr txBox="1">
+            <a:spLocks noGrp="1"/>
+          </p:cNvSpPr>
+          <p:nvPr>
+            <p:ph type="title"/>
+          </p:nvPr>
+        </p:nvSpPr>
+        <p:spPr>
+          <a:xfrm>
+            <a:off x="1289564" y="2114700"/>
+            <a:ext cx="7038900" cy="914100"/>
+          </a:xfrm>
+          <a:prstGeom prst="rect">
+            <a:avLst/>
+          </a:prstGeom>
+        </p:spPr>
+        <p:txBody>
+          <a:bodyPr spcFirstLastPara="1" wrap="square" lIns="91425" tIns="91425" rIns="91425" bIns="91425" anchor="t" anchorCtr="0">
+            <a:normAutofit/>
+          </a:bodyPr>
+          <a:lstStyle/>
+          <a:p>
+            <a:pPr marL="0" lvl="0" indent="0" algn="ctr" rtl="0">
+              <a:spcBef>
+                <a:spcPts val="0"/>
+              </a:spcBef>
+              <a:spcAft>
+                <a:spcPts val="0"/>
+              </a:spcAft>
+              <a:buNone/>
+            </a:pPr>
+            <a:r>
+              <a:rPr lang="en" sz="3000" dirty="0">
+                <a:solidFill>
+                  <a:srgbClr val="41B670"/>
+                </a:solidFill>
+              </a:rPr>
+              <a:t>Section</a:t>
+            </a:r>
+            <a:r>
+              <a:rPr lang="en" sz="3000" dirty="0"/>
+              <a:t> </a:t>
+            </a:r>
+            <a:r>
+              <a:rPr lang="en" sz="3000" dirty="0">
+                <a:solidFill>
+                  <a:srgbClr val="41B670"/>
+                </a:solidFill>
+              </a:rPr>
+              <a:t>title</a:t>
+            </a:r>
+            <a:endParaRPr sz="3000" dirty="0">
+              <a:solidFill>
+                <a:srgbClr val="41B670"/>
+              </a:solidFill>
+            </a:endParaRPr>
+          </a:p>
+        </p:txBody>
+      </p:sp>
+      <p:grpSp>
+        <p:nvGrpSpPr>
+          <p:cNvPr id="179" name="Google Shape;179;p16"/>
+          <p:cNvGrpSpPr/>
+          <p:nvPr/>
+        </p:nvGrpSpPr>
+        <p:grpSpPr>
+          <a:xfrm>
+            <a:off x="6139085" y="4391505"/>
+            <a:ext cx="2918815" cy="794724"/>
+            <a:chOff x="6139085" y="4391505"/>
+            <a:chExt cx="2918815" cy="794724"/>
+          </a:xfrm>
+        </p:grpSpPr>
+        <p:sp>
+          <p:nvSpPr>
+            <p:cNvPr id="180" name="Google Shape;180;p16"/>
+            <p:cNvSpPr/>
+            <p:nvPr/>
+          </p:nvSpPr>
+          <p:spPr>
+            <a:xfrm>
+              <a:off x="6553200" y="4516345"/>
+              <a:ext cx="2504700" cy="405000"/>
+            </a:xfrm>
+            <a:prstGeom prst="roundRect">
+              <a:avLst>
+                <a:gd name="adj" fmla="val 16667"/>
+              </a:avLst>
+            </a:prstGeom>
+            <a:solidFill>
+              <a:srgbClr val="41B670"/>
+            </a:solidFill>
+            <a:ln>
+              <a:noFill/>
+            </a:ln>
+          </p:spPr>
+          <p:txBody>
+            <a:bodyPr spcFirstLastPara="1" wrap="square" lIns="91425" tIns="91425" rIns="91425" bIns="91425" anchor="ctr" anchorCtr="0">
+              <a:noAutofit/>
+            </a:bodyPr>
+            <a:lstStyle/>
+            <a:p>
+              <a:pPr marL="0" lvl="0" indent="0" algn="l" rtl="0">
+                <a:spcBef>
+                  <a:spcPts val="0"/>
+                </a:spcBef>
+                <a:spcAft>
+                  <a:spcPts val="0"/>
+                </a:spcAft>
+                <a:buNone/>
+              </a:pPr>
+              <a:endParaRPr/>
+            </a:p>
+          </p:txBody>
+        </p:sp>
+        <p:grpSp>
+          <p:nvGrpSpPr>
+            <p:cNvPr id="181" name="Google Shape;181;p16"/>
+            <p:cNvGrpSpPr/>
+            <p:nvPr/>
+          </p:nvGrpSpPr>
+          <p:grpSpPr>
+            <a:xfrm>
+              <a:off x="8262877" y="4391505"/>
+              <a:ext cx="711956" cy="654873"/>
+              <a:chOff x="6754350" y="4391718"/>
+              <a:chExt cx="938266" cy="935800"/>
+            </a:xfrm>
+          </p:grpSpPr>
+          <p:sp>
+            <p:nvSpPr>
+              <p:cNvPr id="182" name="Google Shape;182;p16"/>
+              <p:cNvSpPr/>
+              <p:nvPr/>
+            </p:nvSpPr>
+            <p:spPr>
+              <a:xfrm>
+                <a:off x="6754350" y="4461225"/>
+                <a:ext cx="858900" cy="796800"/>
+              </a:xfrm>
+              <a:prstGeom prst="ellipse">
+                <a:avLst/>
+              </a:prstGeom>
+              <a:solidFill>
+                <a:srgbClr val="FFFFFF"/>
+              </a:solidFill>
+              <a:ln>
+                <a:noFill/>
+              </a:ln>
+            </p:spPr>
+            <p:txBody>
+              <a:bodyPr spcFirstLastPara="1" wrap="square" lIns="91425" tIns="91425" rIns="91425" bIns="91425" anchor="ctr" anchorCtr="0">
+                <a:noAutofit/>
+              </a:bodyPr>
+              <a:lstStyle/>
+              <a:p>
+                <a:pPr marL="0" lvl="0" indent="0" algn="l" rtl="0">
+                  <a:spcBef>
+                    <a:spcPts val="0"/>
+                  </a:spcBef>
+                  <a:spcAft>
+                    <a:spcPts val="0"/>
+                  </a:spcAft>
+                  <a:buNone/>
+                </a:pPr>
+                <a:endParaRPr/>
+              </a:p>
+            </p:txBody>
+          </p:sp>
+          <p:pic>
+            <p:nvPicPr>
+              <p:cNvPr id="183" name="Google Shape;183;p16"/>
+              <p:cNvPicPr preferRelativeResize="0"/>
+              <p:nvPr/>
+            </p:nvPicPr>
+            <p:blipFill>
+              <a:blip r:embed="rId3">
+                <a:alphaModFix/>
+              </a:blip>
+              <a:stretch>
+                <a:fillRect/>
+              </a:stretch>
+            </p:blipFill>
+            <p:spPr>
+              <a:xfrm>
+                <a:off x="6756816" y="4391718"/>
+                <a:ext cx="935800" cy="935800"/>
+              </a:xfrm>
+              <a:prstGeom prst="rect">
+                <a:avLst/>
+              </a:prstGeom>
+              <a:noFill/>
+              <a:ln>
+                <a:noFill/>
+              </a:ln>
+            </p:spPr>
+          </p:pic>
+        </p:grpSp>
+        <p:sp>
+          <p:nvSpPr>
+            <p:cNvPr id="184" name="Google Shape;184;p16"/>
+            <p:cNvSpPr txBox="1"/>
+            <p:nvPr/>
+          </p:nvSpPr>
+          <p:spPr>
+            <a:xfrm>
+              <a:off x="6573764" y="4519339"/>
+              <a:ext cx="1754700" cy="400200"/>
+            </a:xfrm>
+            <a:prstGeom prst="rect">
+              <a:avLst/>
+            </a:prstGeom>
+            <a:noFill/>
+            <a:ln>
+              <a:noFill/>
+            </a:ln>
+          </p:spPr>
+          <p:txBody>
+            <a:bodyPr spcFirstLastPara="1" wrap="square" lIns="91425" tIns="91425" rIns="91425" bIns="91425" anchor="t" anchorCtr="0">
+              <a:spAutoFit/>
+            </a:bodyPr>
+            <a:lstStyle/>
+            <a:p>
+              <a:pPr marL="0" lvl="0" indent="0" algn="ctr" rtl="0">
+                <a:spcBef>
+                  <a:spcPts val="0"/>
+                </a:spcBef>
+                <a:spcAft>
+                  <a:spcPts val="0"/>
+                </a:spcAft>
+                <a:buNone/>
+              </a:pPr>
+              <a:r>
+                <a:rPr lang="en">
+                  <a:solidFill>
+                    <a:srgbClr val="FFFFFF"/>
+                  </a:solidFill>
+                  <a:latin typeface="Montserrat SemiBold"/>
+                  <a:ea typeface="Montserrat SemiBold"/>
+                  <a:cs typeface="Montserrat SemiBold"/>
+                  <a:sym typeface="Montserrat SemiBold"/>
+                </a:rPr>
+                <a:t>Orchard Harvest</a:t>
+              </a:r>
+              <a:endParaRPr>
+                <a:solidFill>
+                  <a:srgbClr val="FFFFFF"/>
+                </a:solidFill>
+                <a:latin typeface="Montserrat SemiBold"/>
+                <a:ea typeface="Montserrat SemiBold"/>
+                <a:cs typeface="Montserrat SemiBold"/>
+                <a:sym typeface="Montserrat SemiBold"/>
+              </a:endParaRPr>
+            </a:p>
+          </p:txBody>
+        </p:sp>
+        <p:sp>
+          <p:nvSpPr>
+            <p:cNvPr id="185" name="Google Shape;185;p16"/>
+            <p:cNvSpPr txBox="1"/>
+            <p:nvPr/>
+          </p:nvSpPr>
+          <p:spPr>
+            <a:xfrm>
+              <a:off x="6139085" y="4847529"/>
+              <a:ext cx="2152500" cy="338700"/>
+            </a:xfrm>
+            <a:prstGeom prst="rect">
+              <a:avLst/>
+            </a:prstGeom>
+            <a:noFill/>
+            <a:ln>
+              <a:noFill/>
+            </a:ln>
+          </p:spPr>
+          <p:txBody>
+            <a:bodyPr spcFirstLastPara="1" wrap="square" lIns="91425" tIns="91425" rIns="91425" bIns="91425" anchor="t" anchorCtr="0">
+              <a:spAutoFit/>
+            </a:bodyPr>
+            <a:lstStyle/>
+            <a:p>
+              <a:pPr marL="0" lvl="0" indent="0" algn="r" rtl="0">
+                <a:spcBef>
+                  <a:spcPts val="0"/>
+                </a:spcBef>
+                <a:spcAft>
+                  <a:spcPts val="0"/>
+                </a:spcAft>
+                <a:buNone/>
+              </a:pPr>
+              <a:r>
+                <a:rPr lang="en" sz="1000" b="1" dirty="0">
+                  <a:solidFill>
+                    <a:srgbClr val="41B670"/>
+                  </a:solidFill>
+                  <a:latin typeface="Lato"/>
+                  <a:ea typeface="Lato"/>
+                  <a:cs typeface="Lato"/>
+                  <a:sym typeface="Lato"/>
+                </a:rPr>
+                <a:t>Conference 2024</a:t>
+              </a:r>
+              <a:endParaRPr sz="1000" b="1" dirty="0">
+                <a:solidFill>
+                  <a:srgbClr val="41B670"/>
+                </a:solidFill>
+                <a:latin typeface="Lato"/>
+                <a:ea typeface="Lato"/>
+                <a:cs typeface="Lato"/>
+                <a:sym typeface="Lato"/>
+              </a:endParaRPr>
+            </a:p>
+          </p:txBody>
+        </p:sp>
+        <p:sp>
+          <p:nvSpPr>
+            <p:cNvPr id="186" name="Google Shape;186;p16"/>
+            <p:cNvSpPr/>
+            <p:nvPr/>
+          </p:nvSpPr>
+          <p:spPr>
+            <a:xfrm>
+              <a:off x="8229600" y="4627502"/>
+              <a:ext cx="76200" cy="228600"/>
+            </a:xfrm>
+            <a:prstGeom prst="rect">
+              <a:avLst/>
+            </a:prstGeom>
+            <a:solidFill>
+              <a:srgbClr val="41B670"/>
+            </a:solidFill>
+            <a:ln>
+              <a:noFill/>
+            </a:ln>
+          </p:spPr>
+          <p:txBody>
+            <a:bodyPr spcFirstLastPara="1" wrap="square" lIns="91425" tIns="91425" rIns="91425" bIns="91425" anchor="ctr" anchorCtr="0">
+              <a:noAutofit/>
+            </a:bodyPr>
+            <a:lstStyle/>
+            <a:p>
+              <a:pPr marL="0" lvl="0" indent="0" algn="l" rtl="0">
+                <a:spcBef>
+                  <a:spcPts val="0"/>
+                </a:spcBef>
+                <a:spcAft>
+                  <a:spcPts val="0"/>
+                </a:spcAft>
+                <a:buNone/>
+              </a:pPr>
+              <a:endParaRPr/>
+            </a:p>
+          </p:txBody>
+        </p:sp>
+      </p:grpSp>
+    </p:spTree>
+    <p:extLst>
+      <p:ext uri="{BB962C8B-B14F-4D97-AF65-F5344CB8AC3E}">
+        <p14:creationId xmlns:p14="http://schemas.microsoft.com/office/powerpoint/2010/main" val="186240782"/>
+      </p:ext>
+    </p:extLst>
   </p:cSld>
   <p:clrMapOvr>
     <a:masterClrMapping/>

</xml_diff>

<commit_message>
Adding page number to slides
</commit_message>
<xml_diff>
--- a/Orchard Harvest 2024 presentation template.pptx
+++ b/Orchard Harvest 2024 presentation template.pptx
@@ -1,6 +1,6 @@
 
 <file path=ppt/presentation.xml><?xml version="1.0" encoding="utf-8"?>
-<p:presentation xmlns:a="http://schemas.openxmlformats.org/drawingml/2006/main" xmlns:r="http://schemas.openxmlformats.org/officeDocument/2006/relationships" xmlns:p="http://schemas.openxmlformats.org/presentationml/2006/main" strictFirstAndLastChars="0" embedTrueTypeFonts="1" saveSubsetFonts="1" autoCompressPictures="0">
+<p:presentation xmlns:a="http://schemas.openxmlformats.org/drawingml/2006/main" xmlns:r="http://schemas.openxmlformats.org/officeDocument/2006/relationships" xmlns:p="http://schemas.openxmlformats.org/presentationml/2006/main" showSpecialPlsOnTitleSld="0" strictFirstAndLastChars="0" embedTrueTypeFonts="1" saveSubsetFonts="1" autoCompressPictures="0">
   <p:sldMasterIdLst>
     <p:sldMasterId id="2147483659" r:id="rId1"/>
   </p:sldMasterIdLst>
@@ -8664,7 +8664,7 @@
     <p:sldLayoutId id="2147483657" r:id="rId10"/>
     <p:sldLayoutId id="2147483658" r:id="rId11"/>
   </p:sldLayoutIdLst>
-  <p:hf sldNum="0" hdr="0" ftr="0" dt="0"/>
+  <p:hf hdr="0" ftr="0" dt="0"/>
   <p:txStyles>
     <p:titleStyle>
       <a:defPPr marR="0" lvl="0" algn="l" rtl="0">
@@ -9468,14 +9468,30 @@
               <a:buNone/>
             </a:pPr>
             <a:r>
-              <a:rPr lang="en" sz="1800">
+              <a:rPr lang="en" sz="1800" dirty="0">
                 <a:solidFill>
                   <a:schemeClr val="dk1"/>
                 </a:solidFill>
               </a:rPr>
-              <a:t>Jon Doe</a:t>
+              <a:t>Jo</a:t>
             </a:r>
-            <a:endParaRPr sz="1800">
+            <a:r>
+              <a:rPr lang="hu-HU" sz="1800" dirty="0">
+                <a:solidFill>
+                  <a:schemeClr val="dk1"/>
+                </a:solidFill>
+              </a:rPr>
+              <a:t>h</a:t>
+            </a:r>
+            <a:r>
+              <a:rPr lang="en" sz="1800" dirty="0">
+                <a:solidFill>
+                  <a:schemeClr val="dk1"/>
+                </a:solidFill>
+              </a:rPr>
+              <a:t>n Doe</a:t>
+            </a:r>
+            <a:endParaRPr sz="1800" dirty="0">
               <a:solidFill>
                 <a:schemeClr val="dk1"/>
               </a:solidFill>
@@ -9918,7 +9934,23 @@
                   <a:srgbClr val="41B670"/>
                 </a:solidFill>
               </a:rPr>
-              <a:t>JON DOE</a:t>
+              <a:t>JO</a:t>
+            </a:r>
+            <a:r>
+              <a:rPr lang="hu-HU" sz="2000" b="1" dirty="0">
+                <a:solidFill>
+                  <a:srgbClr val="41B670"/>
+                </a:solidFill>
+              </a:rPr>
+              <a:t>H</a:t>
+            </a:r>
+            <a:r>
+              <a:rPr lang="en" sz="2000" b="1" dirty="0">
+                <a:solidFill>
+                  <a:srgbClr val="41B670"/>
+                </a:solidFill>
+              </a:rPr>
+              <a:t>N DOE</a:t>
             </a:r>
             <a:endParaRPr sz="2000" b="1" dirty="0">
               <a:solidFill>
@@ -10376,6 +10408,57 @@
           </p:txBody>
         </p:sp>
       </p:grpSp>
+      <p:sp>
+        <p:nvSpPr>
+          <p:cNvPr id="3" name="Slide Number Placeholder 2">
+            <a:extLst>
+              <a:ext uri="{FF2B5EF4-FFF2-40B4-BE49-F238E27FC236}">
+                <a16:creationId xmlns:a16="http://schemas.microsoft.com/office/drawing/2014/main" id="{FF3D10D7-48E0-228B-F8EC-9258667C38F4}"/>
+              </a:ext>
+            </a:extLst>
+          </p:cNvPr>
+          <p:cNvSpPr>
+            <a:spLocks noGrp="1"/>
+          </p:cNvSpPr>
+          <p:nvPr>
+            <p:ph type="sldNum" idx="12"/>
+          </p:nvPr>
+        </p:nvSpPr>
+        <p:spPr>
+          <a:xfrm>
+            <a:off x="266836" y="4545002"/>
+            <a:ext cx="548700" cy="393600"/>
+          </a:xfrm>
+        </p:spPr>
+        <p:txBody>
+          <a:bodyPr/>
+          <a:lstStyle/>
+          <a:p>
+            <a:pPr marL="0" lvl="0" indent="0" algn="r" rtl="0">
+              <a:spcBef>
+                <a:spcPts val="0"/>
+              </a:spcBef>
+              <a:spcAft>
+                <a:spcPts val="0"/>
+              </a:spcAft>
+              <a:buNone/>
+            </a:pPr>
+            <a:fld id="{00000000-1234-1234-1234-123412341234}" type="slidenum">
+              <a:rPr lang="en" smtClean="0">
+                <a:solidFill>
+                  <a:schemeClr val="tx1"/>
+                </a:solidFill>
+              </a:rPr>
+              <a:t>2</a:t>
+            </a:fld>
+            <a:endParaRPr lang="en" dirty="0">
+              <a:solidFill>
+                <a:schemeClr val="tx1"/>
+              </a:solidFill>
+            </a:endParaRPr>
+          </a:p>
+        </p:txBody>
+      </p:sp>
     </p:spTree>
   </p:cSld>
   <p:clrMapOvr>
@@ -10862,6 +10945,57 @@
           </p:txBody>
         </p:sp>
       </p:grpSp>
+      <p:sp>
+        <p:nvSpPr>
+          <p:cNvPr id="4" name="Slide Number Placeholder 2">
+            <a:extLst>
+              <a:ext uri="{FF2B5EF4-FFF2-40B4-BE49-F238E27FC236}">
+                <a16:creationId xmlns:a16="http://schemas.microsoft.com/office/drawing/2014/main" id="{291C72FF-186A-F046-D630-D861BD3C5233}"/>
+              </a:ext>
+            </a:extLst>
+          </p:cNvPr>
+          <p:cNvSpPr>
+            <a:spLocks noGrp="1"/>
+          </p:cNvSpPr>
+          <p:nvPr>
+            <p:ph type="sldNum" idx="12"/>
+          </p:nvPr>
+        </p:nvSpPr>
+        <p:spPr>
+          <a:xfrm>
+            <a:off x="266836" y="4545002"/>
+            <a:ext cx="548700" cy="393600"/>
+          </a:xfrm>
+        </p:spPr>
+        <p:txBody>
+          <a:bodyPr/>
+          <a:lstStyle/>
+          <a:p>
+            <a:pPr marL="0" lvl="0" indent="0" algn="r" rtl="0">
+              <a:spcBef>
+                <a:spcPts val="0"/>
+              </a:spcBef>
+              <a:spcAft>
+                <a:spcPts val="0"/>
+              </a:spcAft>
+              <a:buNone/>
+            </a:pPr>
+            <a:fld id="{00000000-1234-1234-1234-123412341234}" type="slidenum">
+              <a:rPr lang="en" smtClean="0">
+                <a:solidFill>
+                  <a:schemeClr val="tx1"/>
+                </a:solidFill>
+              </a:rPr>
+              <a:t>3</a:t>
+            </a:fld>
+            <a:endParaRPr lang="en" dirty="0">
+              <a:solidFill>
+                <a:schemeClr val="tx1"/>
+              </a:solidFill>
+            </a:endParaRPr>
+          </a:p>
+        </p:txBody>
+      </p:sp>
     </p:spTree>
   </p:cSld>
   <p:clrMapOvr>
@@ -11279,6 +11413,57 @@
           </p:txBody>
         </p:sp>
       </p:grpSp>
+      <p:sp>
+        <p:nvSpPr>
+          <p:cNvPr id="3" name="Slide Number Placeholder 2">
+            <a:extLst>
+              <a:ext uri="{FF2B5EF4-FFF2-40B4-BE49-F238E27FC236}">
+                <a16:creationId xmlns:a16="http://schemas.microsoft.com/office/drawing/2014/main" id="{669EAD94-D4D3-047B-7596-97B7715CCE02}"/>
+              </a:ext>
+            </a:extLst>
+          </p:cNvPr>
+          <p:cNvSpPr>
+            <a:spLocks noGrp="1"/>
+          </p:cNvSpPr>
+          <p:nvPr>
+            <p:ph type="sldNum" idx="12"/>
+          </p:nvPr>
+        </p:nvSpPr>
+        <p:spPr>
+          <a:xfrm>
+            <a:off x="266836" y="4545002"/>
+            <a:ext cx="548700" cy="393600"/>
+          </a:xfrm>
+        </p:spPr>
+        <p:txBody>
+          <a:bodyPr/>
+          <a:lstStyle/>
+          <a:p>
+            <a:pPr marL="0" lvl="0" indent="0" algn="r" rtl="0">
+              <a:spcBef>
+                <a:spcPts val="0"/>
+              </a:spcBef>
+              <a:spcAft>
+                <a:spcPts val="0"/>
+              </a:spcAft>
+              <a:buNone/>
+            </a:pPr>
+            <a:fld id="{00000000-1234-1234-1234-123412341234}" type="slidenum">
+              <a:rPr lang="en" smtClean="0">
+                <a:solidFill>
+                  <a:schemeClr val="tx1"/>
+                </a:solidFill>
+              </a:rPr>
+              <a:t>4</a:t>
+            </a:fld>
+            <a:endParaRPr lang="en" dirty="0">
+              <a:solidFill>
+                <a:schemeClr val="tx1"/>
+              </a:solidFill>
+            </a:endParaRPr>
+          </a:p>
+        </p:txBody>
+      </p:sp>
     </p:spTree>
   </p:cSld>
   <p:clrMapOvr>
@@ -11662,6 +11847,57 @@
           </p:txBody>
         </p:sp>
       </p:grpSp>
+      <p:sp>
+        <p:nvSpPr>
+          <p:cNvPr id="3" name="Slide Number Placeholder 2">
+            <a:extLst>
+              <a:ext uri="{FF2B5EF4-FFF2-40B4-BE49-F238E27FC236}">
+                <a16:creationId xmlns:a16="http://schemas.microsoft.com/office/drawing/2014/main" id="{31496FAC-0F39-B359-B814-54331D69D576}"/>
+              </a:ext>
+            </a:extLst>
+          </p:cNvPr>
+          <p:cNvSpPr>
+            <a:spLocks noGrp="1"/>
+          </p:cNvSpPr>
+          <p:nvPr>
+            <p:ph type="sldNum" idx="12"/>
+          </p:nvPr>
+        </p:nvSpPr>
+        <p:spPr>
+          <a:xfrm>
+            <a:off x="266836" y="4545002"/>
+            <a:ext cx="548700" cy="393600"/>
+          </a:xfrm>
+        </p:spPr>
+        <p:txBody>
+          <a:bodyPr/>
+          <a:lstStyle/>
+          <a:p>
+            <a:pPr marL="0" lvl="0" indent="0" algn="r" rtl="0">
+              <a:spcBef>
+                <a:spcPts val="0"/>
+              </a:spcBef>
+              <a:spcAft>
+                <a:spcPts val="0"/>
+              </a:spcAft>
+              <a:buNone/>
+            </a:pPr>
+            <a:fld id="{00000000-1234-1234-1234-123412341234}" type="slidenum">
+              <a:rPr lang="en" smtClean="0">
+                <a:solidFill>
+                  <a:schemeClr val="tx1"/>
+                </a:solidFill>
+              </a:rPr>
+              <a:t>5</a:t>
+            </a:fld>
+            <a:endParaRPr lang="en" dirty="0">
+              <a:solidFill>
+                <a:schemeClr val="tx1"/>
+              </a:solidFill>
+            </a:endParaRPr>
+          </a:p>
+        </p:txBody>
+      </p:sp>
     </p:spTree>
     <p:extLst>
       <p:ext uri="{BB962C8B-B14F-4D97-AF65-F5344CB8AC3E}">

</xml_diff>